<commit_message>
added general exam start
</commit_message>
<xml_diff>
--- a/2_query_gen/paper2_figures.pptx
+++ b/2_query_gen/paper2_figures.pptx
@@ -5,7 +5,7 @@
     <p:sldMasterId id="2147483648" r:id="rId1"/>
   </p:sldMasterIdLst>
   <p:notesMasterIdLst>
-    <p:notesMasterId r:id="rId9"/>
+    <p:notesMasterId r:id="rId10"/>
   </p:notesMasterIdLst>
   <p:sldIdLst>
     <p:sldId id="256" r:id="rId2"/>
@@ -15,6 +15,7 @@
     <p:sldId id="262" r:id="rId6"/>
     <p:sldId id="263" r:id="rId7"/>
     <p:sldId id="264" r:id="rId8"/>
+    <p:sldId id="268" r:id="rId9"/>
   </p:sldIdLst>
   <p:sldSz cx="12192000" cy="6858000"/>
   <p:notesSz cx="6858000" cy="9144000"/>
@@ -203,7 +204,7 @@
           <a:p>
             <a:fld id="{42A7560E-CF1B-6641-BCF4-14C496C90A0E}" type="datetimeFigureOut">
               <a:rPr lang="en-US" smtClean="0"/>
-              <a:t>7/8/22</a:t>
+              <a:t>8/3/22</a:t>
             </a:fld>
             <a:endParaRPr lang="en-US"/>
           </a:p>
@@ -701,7 +702,7 @@
           <a:p>
             <a:fld id="{2DCC8752-14D1-7C42-B332-30A088D89386}" type="datetimeFigureOut">
               <a:rPr lang="en-US" smtClean="0"/>
-              <a:t>7/6/22</a:t>
+              <a:t>8/3/22</a:t>
             </a:fld>
             <a:endParaRPr lang="en-US"/>
           </a:p>
@@ -899,7 +900,7 @@
           <a:p>
             <a:fld id="{2DCC8752-14D1-7C42-B332-30A088D89386}" type="datetimeFigureOut">
               <a:rPr lang="en-US" smtClean="0"/>
-              <a:t>7/6/22</a:t>
+              <a:t>8/3/22</a:t>
             </a:fld>
             <a:endParaRPr lang="en-US"/>
           </a:p>
@@ -1107,7 +1108,7 @@
           <a:p>
             <a:fld id="{2DCC8752-14D1-7C42-B332-30A088D89386}" type="datetimeFigureOut">
               <a:rPr lang="en-US" smtClean="0"/>
-              <a:t>7/6/22</a:t>
+              <a:t>8/3/22</a:t>
             </a:fld>
             <a:endParaRPr lang="en-US"/>
           </a:p>
@@ -1305,7 +1306,7 @@
           <a:p>
             <a:fld id="{2DCC8752-14D1-7C42-B332-30A088D89386}" type="datetimeFigureOut">
               <a:rPr lang="en-US" smtClean="0"/>
-              <a:t>7/6/22</a:t>
+              <a:t>8/3/22</a:t>
             </a:fld>
             <a:endParaRPr lang="en-US"/>
           </a:p>
@@ -1580,7 +1581,7 @@
           <a:p>
             <a:fld id="{2DCC8752-14D1-7C42-B332-30A088D89386}" type="datetimeFigureOut">
               <a:rPr lang="en-US" smtClean="0"/>
-              <a:t>7/6/22</a:t>
+              <a:t>8/3/22</a:t>
             </a:fld>
             <a:endParaRPr lang="en-US"/>
           </a:p>
@@ -1845,7 +1846,7 @@
           <a:p>
             <a:fld id="{2DCC8752-14D1-7C42-B332-30A088D89386}" type="datetimeFigureOut">
               <a:rPr lang="en-US" smtClean="0"/>
-              <a:t>7/6/22</a:t>
+              <a:t>8/3/22</a:t>
             </a:fld>
             <a:endParaRPr lang="en-US"/>
           </a:p>
@@ -2257,7 +2258,7 @@
           <a:p>
             <a:fld id="{2DCC8752-14D1-7C42-B332-30A088D89386}" type="datetimeFigureOut">
               <a:rPr lang="en-US" smtClean="0"/>
-              <a:t>7/6/22</a:t>
+              <a:t>8/3/22</a:t>
             </a:fld>
             <a:endParaRPr lang="en-US"/>
           </a:p>
@@ -2398,7 +2399,7 @@
           <a:p>
             <a:fld id="{2DCC8752-14D1-7C42-B332-30A088D89386}" type="datetimeFigureOut">
               <a:rPr lang="en-US" smtClean="0"/>
-              <a:t>7/6/22</a:t>
+              <a:t>8/3/22</a:t>
             </a:fld>
             <a:endParaRPr lang="en-US"/>
           </a:p>
@@ -2511,7 +2512,7 @@
           <a:p>
             <a:fld id="{2DCC8752-14D1-7C42-B332-30A088D89386}" type="datetimeFigureOut">
               <a:rPr lang="en-US" smtClean="0"/>
-              <a:t>7/6/22</a:t>
+              <a:t>8/3/22</a:t>
             </a:fld>
             <a:endParaRPr lang="en-US"/>
           </a:p>
@@ -2822,7 +2823,7 @@
           <a:p>
             <a:fld id="{2DCC8752-14D1-7C42-B332-30A088D89386}" type="datetimeFigureOut">
               <a:rPr lang="en-US" smtClean="0"/>
-              <a:t>7/6/22</a:t>
+              <a:t>8/3/22</a:t>
             </a:fld>
             <a:endParaRPr lang="en-US"/>
           </a:p>
@@ -3110,7 +3111,7 @@
           <a:p>
             <a:fld id="{2DCC8752-14D1-7C42-B332-30A088D89386}" type="datetimeFigureOut">
               <a:rPr lang="en-US" smtClean="0"/>
-              <a:t>7/6/22</a:t>
+              <a:t>8/3/22</a:t>
             </a:fld>
             <a:endParaRPr lang="en-US"/>
           </a:p>
@@ -3351,7 +3352,7 @@
           <a:p>
             <a:fld id="{2DCC8752-14D1-7C42-B332-30A088D89386}" type="datetimeFigureOut">
               <a:rPr lang="en-US" smtClean="0"/>
-              <a:t>7/6/22</a:t>
+              <a:t>8/3/22</a:t>
             </a:fld>
             <a:endParaRPr lang="en-US"/>
           </a:p>
@@ -3817,6 +3818,64 @@
           <a:p>
             <a:pPr algn="ctr"/>
             <a:endParaRPr lang="en-US"/>
+          </a:p>
+        </p:txBody>
+      </p:sp>
+      <p:sp>
+        <p:nvSpPr>
+          <p:cNvPr id="1070" name="Rounded Rectangle 1069">
+            <a:extLst>
+              <a:ext uri="{FF2B5EF4-FFF2-40B4-BE49-F238E27FC236}">
+                <a16:creationId xmlns:a16="http://schemas.microsoft.com/office/drawing/2014/main" id="{0CD3E6A8-2CCA-C2B3-23BB-3DCDB907119A}"/>
+              </a:ext>
+            </a:extLst>
+          </p:cNvPr>
+          <p:cNvSpPr/>
+          <p:nvPr/>
+        </p:nvSpPr>
+        <p:spPr>
+          <a:xfrm>
+            <a:off x="3046684" y="98495"/>
+            <a:ext cx="7203307" cy="6251142"/>
+          </a:xfrm>
+          <a:prstGeom prst="roundRect">
+            <a:avLst/>
+          </a:prstGeom>
+          <a:solidFill>
+            <a:srgbClr val="E3E8F7">
+              <a:alpha val="50196"/>
+            </a:srgbClr>
+          </a:solidFill>
+          <a:ln>
+            <a:noFill/>
+          </a:ln>
+        </p:spPr>
+        <p:style>
+          <a:lnRef idx="2">
+            <a:schemeClr val="accent1">
+              <a:shade val="50000"/>
+            </a:schemeClr>
+          </a:lnRef>
+          <a:fillRef idx="1">
+            <a:schemeClr val="accent1"/>
+          </a:fillRef>
+          <a:effectRef idx="0">
+            <a:schemeClr val="accent1"/>
+          </a:effectRef>
+          <a:fontRef idx="minor">
+            <a:schemeClr val="lt1"/>
+          </a:fontRef>
+        </p:style>
+        <p:txBody>
+          <a:bodyPr rtlCol="0" anchor="ctr"/>
+          <a:lstStyle/>
+          <a:p>
+            <a:pPr algn="ctr"/>
+            <a:endParaRPr lang="en-US">
+              <a:solidFill>
+                <a:srgbClr val="E3E8F7"/>
+              </a:solidFill>
+            </a:endParaRPr>
           </a:p>
         </p:txBody>
       </p:sp>
@@ -6895,8 +6954,8 @@
             </p:nvSpPr>
             <p:spPr>
               <a:xfrm>
-                <a:off x="7061184" y="2092485"/>
-                <a:ext cx="1399742" cy="430887"/>
+                <a:off x="7074812" y="2092485"/>
+                <a:ext cx="1372492" cy="261610"/>
               </a:xfrm>
               <a:prstGeom prst="rect">
                 <a:avLst/>
@@ -6915,20 +6974,7 @@
                     <a:latin typeface="Roboto Light" panose="02000000000000000000" pitchFamily="2" charset="0"/>
                     <a:ea typeface="Roboto Light" panose="02000000000000000000" pitchFamily="2" charset="0"/>
                   </a:rPr>
-                  <a:t>ICD{9|10}, SNOMED</a:t>
-                </a:r>
-                <a:br>
-                  <a:rPr lang="en-US" sz="1100" dirty="0">
-                    <a:latin typeface="Roboto Light" panose="02000000000000000000" pitchFamily="2" charset="0"/>
-                    <a:ea typeface="Roboto Light" panose="02000000000000000000" pitchFamily="2" charset="0"/>
-                  </a:rPr>
-                </a:br>
-                <a:r>
-                  <a:rPr lang="en-US" sz="1100" dirty="0">
-                    <a:latin typeface="Roboto Light" panose="02000000000000000000" pitchFamily="2" charset="0"/>
-                    <a:ea typeface="Roboto Light" panose="02000000000000000000" pitchFamily="2" charset="0"/>
-                  </a:rPr>
-                  <a:t>Mappings</a:t>
+                  <a:t>COVID-19 Ontology</a:t>
                 </a:r>
               </a:p>
             </p:txBody>
@@ -8325,7 +8371,7 @@
           </p:nvSpPr>
           <p:spPr>
             <a:xfrm>
-              <a:off x="5127537" y="3585919"/>
+              <a:off x="4212743" y="3366547"/>
               <a:ext cx="205740" cy="188258"/>
             </a:xfrm>
             <a:prstGeom prst="ellipse">
@@ -8897,64 +8943,6 @@
           </a:prstGeom>
         </p:spPr>
       </p:pic>
-      <p:sp>
-        <p:nvSpPr>
-          <p:cNvPr id="1070" name="Rounded Rectangle 1069">
-            <a:extLst>
-              <a:ext uri="{FF2B5EF4-FFF2-40B4-BE49-F238E27FC236}">
-                <a16:creationId xmlns:a16="http://schemas.microsoft.com/office/drawing/2014/main" id="{0CD3E6A8-2CCA-C2B3-23BB-3DCDB907119A}"/>
-              </a:ext>
-            </a:extLst>
-          </p:cNvPr>
-          <p:cNvSpPr/>
-          <p:nvPr/>
-        </p:nvSpPr>
-        <p:spPr>
-          <a:xfrm>
-            <a:off x="3046684" y="98495"/>
-            <a:ext cx="7203307" cy="6251142"/>
-          </a:xfrm>
-          <a:prstGeom prst="roundRect">
-            <a:avLst/>
-          </a:prstGeom>
-          <a:solidFill>
-            <a:schemeClr val="accent1">
-              <a:alpha val="5098"/>
-            </a:schemeClr>
-          </a:solidFill>
-          <a:ln>
-            <a:noFill/>
-          </a:ln>
-        </p:spPr>
-        <p:style>
-          <a:lnRef idx="2">
-            <a:schemeClr val="accent1">
-              <a:shade val="50000"/>
-            </a:schemeClr>
-          </a:lnRef>
-          <a:fillRef idx="1">
-            <a:schemeClr val="accent1"/>
-          </a:fillRef>
-          <a:effectRef idx="0">
-            <a:schemeClr val="accent1"/>
-          </a:effectRef>
-          <a:fontRef idx="minor">
-            <a:schemeClr val="lt1"/>
-          </a:fontRef>
-        </p:style>
-        <p:txBody>
-          <a:bodyPr rtlCol="0" anchor="ctr"/>
-          <a:lstStyle/>
-          <a:p>
-            <a:pPr algn="ctr"/>
-            <a:endParaRPr lang="en-US">
-              <a:solidFill>
-                <a:srgbClr val="E3E8F7"/>
-              </a:solidFill>
-            </a:endParaRPr>
-          </a:p>
-        </p:txBody>
-      </p:sp>
     </p:spTree>
     <p:extLst>
       <p:ext uri="{BB962C8B-B14F-4D97-AF65-F5344CB8AC3E}">
@@ -8999,7 +8987,7 @@
         </p:nvSpPr>
         <p:spPr>
           <a:xfrm>
-            <a:off x="-1134318" y="1"/>
+            <a:off x="-1134319" y="3514"/>
             <a:ext cx="13195602" cy="7588468"/>
           </a:xfrm>
           <a:prstGeom prst="rect">
@@ -13835,8 +13823,8 @@
             <a:pPr algn="ctr"/>
             <a:r>
               <a:rPr lang="en-US" sz="1100" dirty="0">
-                <a:latin typeface="Roboto Light" panose="02000000000000000000" pitchFamily="2" charset="0"/>
-                <a:ea typeface="Roboto Light" panose="02000000000000000000" pitchFamily="2" charset="0"/>
+                <a:latin typeface="Roboto" panose="02000000000000000000" pitchFamily="2" charset="0"/>
+                <a:ea typeface="Roboto" panose="02000000000000000000" pitchFamily="2" charset="0"/>
               </a:rPr>
               <a:t>Raw input</a:t>
             </a:r>
@@ -13857,8 +13845,8 @@
         </p:nvSpPr>
         <p:spPr>
           <a:xfrm>
-            <a:off x="-1074553" y="1636508"/>
-            <a:ext cx="1133508" cy="602841"/>
+            <a:off x="-1074554" y="1636508"/>
+            <a:ext cx="1219331" cy="602841"/>
           </a:xfrm>
           <a:prstGeom prst="roundRect">
             <a:avLst/>
@@ -13890,8 +13878,8 @@
             <a:pPr algn="ctr"/>
             <a:r>
               <a:rPr lang="en-US" sz="1100" dirty="0">
-                <a:latin typeface="Roboto Light" panose="02000000000000000000" pitchFamily="2" charset="0"/>
-                <a:ea typeface="Roboto Light" panose="02000000000000000000" pitchFamily="2" charset="0"/>
+                <a:latin typeface="Roboto" panose="02000000000000000000" pitchFamily="2" charset="0"/>
+                <a:ea typeface="Roboto" panose="02000000000000000000" pitchFamily="2" charset="0"/>
               </a:rPr>
               <a:t>Predict named entities and relations</a:t>
             </a:r>
@@ -13912,8 +13900,8 @@
         </p:nvSpPr>
         <p:spPr>
           <a:xfrm>
-            <a:off x="-1032188" y="4003177"/>
-            <a:ext cx="1054931" cy="583426"/>
+            <a:off x="-1058905" y="3977948"/>
+            <a:ext cx="1176965" cy="583426"/>
           </a:xfrm>
           <a:prstGeom prst="roundRect">
             <a:avLst/>
@@ -13945,8 +13933,8 @@
             <a:pPr algn="ctr"/>
             <a:r>
               <a:rPr lang="en-US" sz="1100" dirty="0">
-                <a:latin typeface="Roboto Light" panose="02000000000000000000" pitchFamily="2" charset="0"/>
-                <a:ea typeface="Roboto Light" panose="02000000000000000000" pitchFamily="2" charset="0"/>
+                <a:latin typeface="Roboto" panose="02000000000000000000" pitchFamily="2" charset="0"/>
+                <a:ea typeface="Roboto" panose="02000000000000000000" pitchFamily="2" charset="0"/>
               </a:rPr>
               <a:t>Transform to logical form input string</a:t>
             </a:r>
@@ -14000,8 +13988,8 @@
             <a:pPr algn="ctr"/>
             <a:r>
               <a:rPr lang="en-US" sz="1100" dirty="0">
-                <a:latin typeface="Roboto Light" panose="02000000000000000000" pitchFamily="2" charset="0"/>
-                <a:ea typeface="Roboto Light" panose="02000000000000000000" pitchFamily="2" charset="0"/>
+                <a:latin typeface="Roboto" panose="02000000000000000000" pitchFamily="2" charset="0"/>
+                <a:ea typeface="Roboto" panose="02000000000000000000" pitchFamily="2" charset="0"/>
               </a:rPr>
               <a:t>Predict logical form structure</a:t>
             </a:r>
@@ -14202,8 +14190,8 @@
             <a:pPr algn="ctr"/>
             <a:r>
               <a:rPr lang="en-US" sz="1100" dirty="0">
-                <a:latin typeface="Roboto Light" panose="02000000000000000000" pitchFamily="2" charset="0"/>
-                <a:ea typeface="Roboto Light" panose="02000000000000000000" pitchFamily="2" charset="0"/>
+                <a:latin typeface="Roboto" panose="02000000000000000000" pitchFamily="2" charset="0"/>
+                <a:ea typeface="Roboto" panose="02000000000000000000" pitchFamily="2" charset="0"/>
               </a:rPr>
               <a:t>Normalize to UMLS concepts</a:t>
             </a:r>
@@ -14224,8 +14212,8 @@
         </p:nvSpPr>
         <p:spPr>
           <a:xfrm>
-            <a:off x="5538098" y="2854801"/>
-            <a:ext cx="1306455" cy="738664"/>
+            <a:off x="5495691" y="2864074"/>
+            <a:ext cx="1400683" cy="738664"/>
           </a:xfrm>
           <a:prstGeom prst="roundRect">
             <a:avLst/>
@@ -14257,10 +14245,10 @@
             <a:pPr algn="ctr"/>
             <a:r>
               <a:rPr lang="en-US" sz="1100" dirty="0">
-                <a:latin typeface="Roboto Light" panose="02000000000000000000" pitchFamily="2" charset="0"/>
-                <a:ea typeface="Roboto Light" panose="02000000000000000000" pitchFamily="2" charset="0"/>
+                <a:latin typeface="Roboto" panose="02000000000000000000" pitchFamily="2" charset="0"/>
+                <a:ea typeface="Roboto" panose="02000000000000000000" pitchFamily="2" charset="0"/>
               </a:rPr>
-              <a:t>Use Knowledge Base to Reason unspecified criteria</a:t>
+              <a:t>Use Knowledge Base to reason upon unspecified criteria</a:t>
             </a:r>
           </a:p>
         </p:txBody>
@@ -14312,8 +14300,8 @@
             <a:pPr algn="ctr"/>
             <a:r>
               <a:rPr lang="en-US" sz="1100" dirty="0">
-                <a:latin typeface="Roboto Light" panose="02000000000000000000" pitchFamily="2" charset="0"/>
-                <a:ea typeface="Roboto Light" panose="02000000000000000000" pitchFamily="2" charset="0"/>
+                <a:latin typeface="Roboto" panose="02000000000000000000" pitchFamily="2" charset="0"/>
+                <a:ea typeface="Roboto" panose="02000000000000000000" pitchFamily="2" charset="0"/>
               </a:rPr>
               <a:t>Map to database Semantic Metadata Annotation and generate SQL queries</a:t>
             </a:r>
@@ -28078,6 +28066,1639 @@
 </p:sld>
 </file>
 
+<file path=ppt/slides/slide8.xml><?xml version="1.0" encoding="utf-8"?>
+<p:sld xmlns:a="http://schemas.openxmlformats.org/drawingml/2006/main" xmlns:r="http://schemas.openxmlformats.org/officeDocument/2006/relationships" xmlns:p="http://schemas.openxmlformats.org/presentationml/2006/main">
+  <p:cSld>
+    <p:spTree>
+      <p:nvGrpSpPr>
+        <p:cNvPr id="1" name=""/>
+        <p:cNvGrpSpPr/>
+        <p:nvPr/>
+      </p:nvGrpSpPr>
+      <p:grpSpPr>
+        <a:xfrm>
+          <a:off x="0" y="0"/>
+          <a:ext cx="0" cy="0"/>
+          <a:chOff x="0" y="0"/>
+          <a:chExt cx="0" cy="0"/>
+        </a:xfrm>
+      </p:grpSpPr>
+      <p:sp>
+        <p:nvSpPr>
+          <p:cNvPr id="6" name="Rectangle 5">
+            <a:extLst>
+              <a:ext uri="{FF2B5EF4-FFF2-40B4-BE49-F238E27FC236}">
+                <a16:creationId xmlns:a16="http://schemas.microsoft.com/office/drawing/2014/main" id="{C276FB95-1FAE-747D-DA95-88B06FE6A470}"/>
+              </a:ext>
+            </a:extLst>
+          </p:cNvPr>
+          <p:cNvSpPr/>
+          <p:nvPr/>
+        </p:nvSpPr>
+        <p:spPr>
+          <a:xfrm>
+            <a:off x="3434080" y="2194560"/>
+            <a:ext cx="2753360" cy="386080"/>
+          </a:xfrm>
+          <a:prstGeom prst="rect">
+            <a:avLst/>
+          </a:prstGeom>
+          <a:solidFill>
+            <a:schemeClr val="accent5"/>
+          </a:solidFill>
+          <a:ln>
+            <a:noFill/>
+          </a:ln>
+        </p:spPr>
+        <p:style>
+          <a:lnRef idx="2">
+            <a:schemeClr val="accent1">
+              <a:shade val="50000"/>
+            </a:schemeClr>
+          </a:lnRef>
+          <a:fillRef idx="1">
+            <a:schemeClr val="accent1"/>
+          </a:fillRef>
+          <a:effectRef idx="0">
+            <a:schemeClr val="accent1"/>
+          </a:effectRef>
+          <a:fontRef idx="minor">
+            <a:schemeClr val="lt1"/>
+          </a:fontRef>
+        </p:style>
+        <p:txBody>
+          <a:bodyPr rtlCol="0" anchor="ctr"/>
+          <a:lstStyle/>
+          <a:p>
+            <a:pPr algn="ctr"/>
+            <a:endParaRPr lang="en-US"/>
+          </a:p>
+        </p:txBody>
+      </p:sp>
+      <p:sp>
+        <p:nvSpPr>
+          <p:cNvPr id="7" name="Rectangle 6">
+            <a:extLst>
+              <a:ext uri="{FF2B5EF4-FFF2-40B4-BE49-F238E27FC236}">
+                <a16:creationId xmlns:a16="http://schemas.microsoft.com/office/drawing/2014/main" id="{63A29296-CBC7-EB98-E3E2-18ABE8798C58}"/>
+              </a:ext>
+            </a:extLst>
+          </p:cNvPr>
+          <p:cNvSpPr/>
+          <p:nvPr/>
+        </p:nvSpPr>
+        <p:spPr>
+          <a:xfrm>
+            <a:off x="6258560" y="2194560"/>
+            <a:ext cx="1402080" cy="386080"/>
+          </a:xfrm>
+          <a:prstGeom prst="rect">
+            <a:avLst/>
+          </a:prstGeom>
+          <a:gradFill flip="none" rotWithShape="1">
+            <a:gsLst>
+              <a:gs pos="0">
+                <a:schemeClr val="accent5"/>
+              </a:gs>
+              <a:gs pos="100000">
+                <a:schemeClr val="accent4"/>
+              </a:gs>
+              <a:gs pos="100000">
+                <a:srgbClr val="FFC000"/>
+              </a:gs>
+            </a:gsLst>
+            <a:lin ang="0" scaled="1"/>
+            <a:tileRect/>
+          </a:gradFill>
+          <a:ln>
+            <a:noFill/>
+          </a:ln>
+        </p:spPr>
+        <p:style>
+          <a:lnRef idx="2">
+            <a:schemeClr val="accent1">
+              <a:shade val="50000"/>
+            </a:schemeClr>
+          </a:lnRef>
+          <a:fillRef idx="1">
+            <a:schemeClr val="accent1"/>
+          </a:fillRef>
+          <a:effectRef idx="0">
+            <a:schemeClr val="accent1"/>
+          </a:effectRef>
+          <a:fontRef idx="minor">
+            <a:schemeClr val="lt1"/>
+          </a:fontRef>
+        </p:style>
+        <p:txBody>
+          <a:bodyPr rtlCol="0" anchor="ctr"/>
+          <a:lstStyle/>
+          <a:p>
+            <a:pPr algn="ctr"/>
+            <a:endParaRPr lang="en-US" dirty="0"/>
+          </a:p>
+        </p:txBody>
+      </p:sp>
+      <p:sp>
+        <p:nvSpPr>
+          <p:cNvPr id="8" name="Rectangle 7">
+            <a:extLst>
+              <a:ext uri="{FF2B5EF4-FFF2-40B4-BE49-F238E27FC236}">
+                <a16:creationId xmlns:a16="http://schemas.microsoft.com/office/drawing/2014/main" id="{3ACFA50E-92EE-5F70-DCDE-354EA3FD4467}"/>
+              </a:ext>
+            </a:extLst>
+          </p:cNvPr>
+          <p:cNvSpPr/>
+          <p:nvPr/>
+        </p:nvSpPr>
+        <p:spPr>
+          <a:xfrm>
+            <a:off x="7741920" y="2194560"/>
+            <a:ext cx="2326640" cy="386080"/>
+          </a:xfrm>
+          <a:prstGeom prst="rect">
+            <a:avLst/>
+          </a:prstGeom>
+          <a:solidFill>
+            <a:srgbClr val="FFC000"/>
+          </a:solidFill>
+          <a:ln>
+            <a:noFill/>
+          </a:ln>
+        </p:spPr>
+        <p:style>
+          <a:lnRef idx="2">
+            <a:schemeClr val="accent1">
+              <a:shade val="50000"/>
+            </a:schemeClr>
+          </a:lnRef>
+          <a:fillRef idx="1">
+            <a:schemeClr val="accent1"/>
+          </a:fillRef>
+          <a:effectRef idx="0">
+            <a:schemeClr val="accent1"/>
+          </a:effectRef>
+          <a:fontRef idx="minor">
+            <a:schemeClr val="lt1"/>
+          </a:fontRef>
+        </p:style>
+        <p:txBody>
+          <a:bodyPr rtlCol="0" anchor="ctr"/>
+          <a:lstStyle/>
+          <a:p>
+            <a:pPr algn="ctr"/>
+            <a:endParaRPr lang="en-US"/>
+          </a:p>
+        </p:txBody>
+      </p:sp>
+      <p:sp>
+        <p:nvSpPr>
+          <p:cNvPr id="11" name="TextBox 10">
+            <a:extLst>
+              <a:ext uri="{FF2B5EF4-FFF2-40B4-BE49-F238E27FC236}">
+                <a16:creationId xmlns:a16="http://schemas.microsoft.com/office/drawing/2014/main" id="{F1619607-D6B9-3521-D428-B294C5CF7044}"/>
+              </a:ext>
+            </a:extLst>
+          </p:cNvPr>
+          <p:cNvSpPr txBox="1"/>
+          <p:nvPr/>
+        </p:nvSpPr>
+        <p:spPr>
+          <a:xfrm>
+            <a:off x="1737360" y="2194560"/>
+            <a:ext cx="1515158" cy="369332"/>
+          </a:xfrm>
+          <a:prstGeom prst="rect">
+            <a:avLst/>
+          </a:prstGeom>
+          <a:noFill/>
+        </p:spPr>
+        <p:txBody>
+          <a:bodyPr wrap="none" rtlCol="0">
+            <a:spAutoFit/>
+          </a:bodyPr>
+          <a:lstStyle/>
+          <a:p>
+            <a:r>
+              <a:rPr lang="en-US" dirty="0">
+                <a:latin typeface="Roboto Light" panose="02000000000000000000" pitchFamily="2" charset="0"/>
+                <a:ea typeface="Roboto Light" panose="02000000000000000000" pitchFamily="2" charset="0"/>
+              </a:rPr>
+              <a:t>Tobacco Use</a:t>
+            </a:r>
+          </a:p>
+        </p:txBody>
+      </p:sp>
+      <p:sp>
+        <p:nvSpPr>
+          <p:cNvPr id="12" name="TextBox 11">
+            <a:extLst>
+              <a:ext uri="{FF2B5EF4-FFF2-40B4-BE49-F238E27FC236}">
+                <a16:creationId xmlns:a16="http://schemas.microsoft.com/office/drawing/2014/main" id="{273CB21C-39D9-C185-86E6-1487F184D736}"/>
+              </a:ext>
+            </a:extLst>
+          </p:cNvPr>
+          <p:cNvSpPr txBox="1"/>
+          <p:nvPr/>
+        </p:nvSpPr>
+        <p:spPr>
+          <a:xfrm>
+            <a:off x="4481182" y="1927423"/>
+            <a:ext cx="659155" cy="307777"/>
+          </a:xfrm>
+          <a:prstGeom prst="rect">
+            <a:avLst/>
+          </a:prstGeom>
+          <a:noFill/>
+        </p:spPr>
+        <p:txBody>
+          <a:bodyPr wrap="none" rtlCol="0">
+            <a:spAutoFit/>
+          </a:bodyPr>
+          <a:lstStyle/>
+          <a:p>
+            <a:r>
+              <a:rPr lang="en-US" sz="1400" dirty="0">
+                <a:latin typeface="Roboto Light" panose="02000000000000000000" pitchFamily="2" charset="0"/>
+                <a:ea typeface="Roboto Light" panose="02000000000000000000" pitchFamily="2" charset="0"/>
+              </a:rPr>
+              <a:t>42.4%</a:t>
+            </a:r>
+          </a:p>
+        </p:txBody>
+      </p:sp>
+      <p:sp>
+        <p:nvSpPr>
+          <p:cNvPr id="13" name="TextBox 12">
+            <a:extLst>
+              <a:ext uri="{FF2B5EF4-FFF2-40B4-BE49-F238E27FC236}">
+                <a16:creationId xmlns:a16="http://schemas.microsoft.com/office/drawing/2014/main" id="{5FA53418-B98B-DB2E-DA99-634C097145E2}"/>
+              </a:ext>
+            </a:extLst>
+          </p:cNvPr>
+          <p:cNvSpPr txBox="1"/>
+          <p:nvPr/>
+        </p:nvSpPr>
+        <p:spPr>
+          <a:xfrm>
+            <a:off x="6640182" y="1927422"/>
+            <a:ext cx="659155" cy="307777"/>
+          </a:xfrm>
+          <a:prstGeom prst="rect">
+            <a:avLst/>
+          </a:prstGeom>
+          <a:noFill/>
+        </p:spPr>
+        <p:txBody>
+          <a:bodyPr wrap="none" rtlCol="0">
+            <a:spAutoFit/>
+          </a:bodyPr>
+          <a:lstStyle/>
+          <a:p>
+            <a:r>
+              <a:rPr lang="en-US" sz="1400" dirty="0">
+                <a:latin typeface="Roboto Light" panose="02000000000000000000" pitchFamily="2" charset="0"/>
+                <a:ea typeface="Roboto Light" panose="02000000000000000000" pitchFamily="2" charset="0"/>
+              </a:rPr>
+              <a:t>21.4%</a:t>
+            </a:r>
+          </a:p>
+        </p:txBody>
+      </p:sp>
+      <p:sp>
+        <p:nvSpPr>
+          <p:cNvPr id="14" name="TextBox 13">
+            <a:extLst>
+              <a:ext uri="{FF2B5EF4-FFF2-40B4-BE49-F238E27FC236}">
+                <a16:creationId xmlns:a16="http://schemas.microsoft.com/office/drawing/2014/main" id="{9C5F941A-04CB-ACC1-6847-7B553FB35BEB}"/>
+              </a:ext>
+            </a:extLst>
+          </p:cNvPr>
+          <p:cNvSpPr txBox="1"/>
+          <p:nvPr/>
+        </p:nvSpPr>
+        <p:spPr>
+          <a:xfrm>
+            <a:off x="8585822" y="1927421"/>
+            <a:ext cx="659155" cy="307777"/>
+          </a:xfrm>
+          <a:prstGeom prst="rect">
+            <a:avLst/>
+          </a:prstGeom>
+          <a:noFill/>
+        </p:spPr>
+        <p:txBody>
+          <a:bodyPr wrap="none" rtlCol="0">
+            <a:spAutoFit/>
+          </a:bodyPr>
+          <a:lstStyle/>
+          <a:p>
+            <a:r>
+              <a:rPr lang="en-US" sz="1400" dirty="0">
+                <a:latin typeface="Roboto Light" panose="02000000000000000000" pitchFamily="2" charset="0"/>
+                <a:ea typeface="Roboto Light" panose="02000000000000000000" pitchFamily="2" charset="0"/>
+              </a:rPr>
+              <a:t>36.2%</a:t>
+            </a:r>
+          </a:p>
+        </p:txBody>
+      </p:sp>
+      <p:sp>
+        <p:nvSpPr>
+          <p:cNvPr id="15" name="Rectangle 14">
+            <a:extLst>
+              <a:ext uri="{FF2B5EF4-FFF2-40B4-BE49-F238E27FC236}">
+                <a16:creationId xmlns:a16="http://schemas.microsoft.com/office/drawing/2014/main" id="{9BA1F5BD-8335-056B-07CC-6779DB43F24E}"/>
+              </a:ext>
+            </a:extLst>
+          </p:cNvPr>
+          <p:cNvSpPr/>
+          <p:nvPr/>
+        </p:nvSpPr>
+        <p:spPr>
+          <a:xfrm>
+            <a:off x="3434080" y="2915579"/>
+            <a:ext cx="4480560" cy="386080"/>
+          </a:xfrm>
+          <a:prstGeom prst="rect">
+            <a:avLst/>
+          </a:prstGeom>
+          <a:solidFill>
+            <a:schemeClr val="accent5"/>
+          </a:solidFill>
+          <a:ln>
+            <a:noFill/>
+          </a:ln>
+        </p:spPr>
+        <p:style>
+          <a:lnRef idx="2">
+            <a:schemeClr val="accent1">
+              <a:shade val="50000"/>
+            </a:schemeClr>
+          </a:lnRef>
+          <a:fillRef idx="1">
+            <a:schemeClr val="accent1"/>
+          </a:fillRef>
+          <a:effectRef idx="0">
+            <a:schemeClr val="accent1"/>
+          </a:effectRef>
+          <a:fontRef idx="minor">
+            <a:schemeClr val="lt1"/>
+          </a:fontRef>
+        </p:style>
+        <p:txBody>
+          <a:bodyPr rtlCol="0" anchor="ctr"/>
+          <a:lstStyle/>
+          <a:p>
+            <a:pPr algn="ctr"/>
+            <a:endParaRPr lang="en-US"/>
+          </a:p>
+        </p:txBody>
+      </p:sp>
+      <p:sp>
+        <p:nvSpPr>
+          <p:cNvPr id="16" name="Rectangle 15">
+            <a:extLst>
+              <a:ext uri="{FF2B5EF4-FFF2-40B4-BE49-F238E27FC236}">
+                <a16:creationId xmlns:a16="http://schemas.microsoft.com/office/drawing/2014/main" id="{E92E2DCE-855E-A486-E549-B77C2FB6C356}"/>
+              </a:ext>
+            </a:extLst>
+          </p:cNvPr>
+          <p:cNvSpPr/>
+          <p:nvPr/>
+        </p:nvSpPr>
+        <p:spPr>
+          <a:xfrm>
+            <a:off x="7983842" y="2913793"/>
+            <a:ext cx="1361440" cy="386080"/>
+          </a:xfrm>
+          <a:prstGeom prst="rect">
+            <a:avLst/>
+          </a:prstGeom>
+          <a:gradFill flip="none" rotWithShape="1">
+            <a:gsLst>
+              <a:gs pos="0">
+                <a:schemeClr val="accent5"/>
+              </a:gs>
+              <a:gs pos="100000">
+                <a:schemeClr val="accent4"/>
+              </a:gs>
+              <a:gs pos="100000">
+                <a:srgbClr val="FFC000"/>
+              </a:gs>
+            </a:gsLst>
+            <a:lin ang="0" scaled="1"/>
+            <a:tileRect/>
+          </a:gradFill>
+          <a:ln>
+            <a:noFill/>
+          </a:ln>
+        </p:spPr>
+        <p:style>
+          <a:lnRef idx="2">
+            <a:schemeClr val="accent1">
+              <a:shade val="50000"/>
+            </a:schemeClr>
+          </a:lnRef>
+          <a:fillRef idx="1">
+            <a:schemeClr val="accent1"/>
+          </a:fillRef>
+          <a:effectRef idx="0">
+            <a:schemeClr val="accent1"/>
+          </a:effectRef>
+          <a:fontRef idx="minor">
+            <a:schemeClr val="lt1"/>
+          </a:fontRef>
+        </p:style>
+        <p:txBody>
+          <a:bodyPr rtlCol="0" anchor="ctr"/>
+          <a:lstStyle/>
+          <a:p>
+            <a:pPr algn="ctr"/>
+            <a:endParaRPr lang="en-US" dirty="0"/>
+          </a:p>
+        </p:txBody>
+      </p:sp>
+      <p:sp>
+        <p:nvSpPr>
+          <p:cNvPr id="17" name="Rectangle 16">
+            <a:extLst>
+              <a:ext uri="{FF2B5EF4-FFF2-40B4-BE49-F238E27FC236}">
+                <a16:creationId xmlns:a16="http://schemas.microsoft.com/office/drawing/2014/main" id="{44EEE1CC-F75A-DB94-A562-113A3FFBA61B}"/>
+              </a:ext>
+            </a:extLst>
+          </p:cNvPr>
+          <p:cNvSpPr/>
+          <p:nvPr/>
+        </p:nvSpPr>
+        <p:spPr>
+          <a:xfrm>
+            <a:off x="9414484" y="2907205"/>
+            <a:ext cx="640080" cy="386080"/>
+          </a:xfrm>
+          <a:prstGeom prst="rect">
+            <a:avLst/>
+          </a:prstGeom>
+          <a:solidFill>
+            <a:srgbClr val="FFC000"/>
+          </a:solidFill>
+          <a:ln>
+            <a:noFill/>
+          </a:ln>
+        </p:spPr>
+        <p:style>
+          <a:lnRef idx="2">
+            <a:schemeClr val="accent1">
+              <a:shade val="50000"/>
+            </a:schemeClr>
+          </a:lnRef>
+          <a:fillRef idx="1">
+            <a:schemeClr val="accent1"/>
+          </a:fillRef>
+          <a:effectRef idx="0">
+            <a:schemeClr val="accent1"/>
+          </a:effectRef>
+          <a:fontRef idx="minor">
+            <a:schemeClr val="lt1"/>
+          </a:fontRef>
+        </p:style>
+        <p:txBody>
+          <a:bodyPr rtlCol="0" anchor="ctr"/>
+          <a:lstStyle/>
+          <a:p>
+            <a:pPr algn="ctr"/>
+            <a:endParaRPr lang="en-US"/>
+          </a:p>
+        </p:txBody>
+      </p:sp>
+      <p:sp>
+        <p:nvSpPr>
+          <p:cNvPr id="18" name="TextBox 17">
+            <a:extLst>
+              <a:ext uri="{FF2B5EF4-FFF2-40B4-BE49-F238E27FC236}">
+                <a16:creationId xmlns:a16="http://schemas.microsoft.com/office/drawing/2014/main" id="{1CF6E622-7709-776B-A8A6-03B5715E245F}"/>
+              </a:ext>
+            </a:extLst>
+          </p:cNvPr>
+          <p:cNvSpPr txBox="1"/>
+          <p:nvPr/>
+        </p:nvSpPr>
+        <p:spPr>
+          <a:xfrm>
+            <a:off x="1872012" y="2934065"/>
+            <a:ext cx="1380506" cy="369332"/>
+          </a:xfrm>
+          <a:prstGeom prst="rect">
+            <a:avLst/>
+          </a:prstGeom>
+          <a:noFill/>
+        </p:spPr>
+        <p:txBody>
+          <a:bodyPr wrap="none" rtlCol="0">
+            <a:spAutoFit/>
+          </a:bodyPr>
+          <a:lstStyle/>
+          <a:p>
+            <a:r>
+              <a:rPr lang="en-US" dirty="0">
+                <a:latin typeface="Roboto Light" panose="02000000000000000000" pitchFamily="2" charset="0"/>
+                <a:ea typeface="Roboto Light" panose="02000000000000000000" pitchFamily="2" charset="0"/>
+              </a:rPr>
+              <a:t>Alcohol Use</a:t>
+            </a:r>
+          </a:p>
+        </p:txBody>
+      </p:sp>
+      <p:sp>
+        <p:nvSpPr>
+          <p:cNvPr id="19" name="TextBox 18">
+            <a:extLst>
+              <a:ext uri="{FF2B5EF4-FFF2-40B4-BE49-F238E27FC236}">
+                <a16:creationId xmlns:a16="http://schemas.microsoft.com/office/drawing/2014/main" id="{1385365F-6FB0-B13F-7054-1B4F7BE94A38}"/>
+              </a:ext>
+            </a:extLst>
+          </p:cNvPr>
+          <p:cNvSpPr txBox="1"/>
+          <p:nvPr/>
+        </p:nvSpPr>
+        <p:spPr>
+          <a:xfrm>
+            <a:off x="5222241" y="2633178"/>
+            <a:ext cx="659155" cy="307777"/>
+          </a:xfrm>
+          <a:prstGeom prst="rect">
+            <a:avLst/>
+          </a:prstGeom>
+          <a:noFill/>
+        </p:spPr>
+        <p:txBody>
+          <a:bodyPr wrap="none" rtlCol="0">
+            <a:spAutoFit/>
+          </a:bodyPr>
+          <a:lstStyle/>
+          <a:p>
+            <a:r>
+              <a:rPr lang="en-US" sz="1400" dirty="0">
+                <a:latin typeface="Roboto Light" panose="02000000000000000000" pitchFamily="2" charset="0"/>
+                <a:ea typeface="Roboto Light" panose="02000000000000000000" pitchFamily="2" charset="0"/>
+              </a:rPr>
+              <a:t>71.3%</a:t>
+            </a:r>
+          </a:p>
+        </p:txBody>
+      </p:sp>
+      <p:sp>
+        <p:nvSpPr>
+          <p:cNvPr id="20" name="TextBox 19">
+            <a:extLst>
+              <a:ext uri="{FF2B5EF4-FFF2-40B4-BE49-F238E27FC236}">
+                <a16:creationId xmlns:a16="http://schemas.microsoft.com/office/drawing/2014/main" id="{2DD30AF1-029A-382C-6710-AB52FA2EAD88}"/>
+              </a:ext>
+            </a:extLst>
+          </p:cNvPr>
+          <p:cNvSpPr txBox="1"/>
+          <p:nvPr/>
+        </p:nvSpPr>
+        <p:spPr>
+          <a:xfrm>
+            <a:off x="8370007" y="2633178"/>
+            <a:ext cx="659155" cy="307777"/>
+          </a:xfrm>
+          <a:prstGeom prst="rect">
+            <a:avLst/>
+          </a:prstGeom>
+          <a:noFill/>
+        </p:spPr>
+        <p:txBody>
+          <a:bodyPr wrap="none" rtlCol="0">
+            <a:spAutoFit/>
+          </a:bodyPr>
+          <a:lstStyle/>
+          <a:p>
+            <a:r>
+              <a:rPr lang="en-US" sz="1400" dirty="0">
+                <a:latin typeface="Roboto Light" panose="02000000000000000000" pitchFamily="2" charset="0"/>
+                <a:ea typeface="Roboto Light" panose="02000000000000000000" pitchFamily="2" charset="0"/>
+              </a:rPr>
+              <a:t>20.3%</a:t>
+            </a:r>
+          </a:p>
+        </p:txBody>
+      </p:sp>
+      <p:sp>
+        <p:nvSpPr>
+          <p:cNvPr id="21" name="TextBox 20">
+            <a:extLst>
+              <a:ext uri="{FF2B5EF4-FFF2-40B4-BE49-F238E27FC236}">
+                <a16:creationId xmlns:a16="http://schemas.microsoft.com/office/drawing/2014/main" id="{3A6260BC-4459-9B3D-3AC3-BCD1A0A35027}"/>
+              </a:ext>
+            </a:extLst>
+          </p:cNvPr>
+          <p:cNvSpPr txBox="1"/>
+          <p:nvPr/>
+        </p:nvSpPr>
+        <p:spPr>
+          <a:xfrm>
+            <a:off x="9525973" y="2633178"/>
+            <a:ext cx="417102" cy="307777"/>
+          </a:xfrm>
+          <a:prstGeom prst="rect">
+            <a:avLst/>
+          </a:prstGeom>
+          <a:noFill/>
+        </p:spPr>
+        <p:txBody>
+          <a:bodyPr wrap="none" rtlCol="0">
+            <a:spAutoFit/>
+          </a:bodyPr>
+          <a:lstStyle/>
+          <a:p>
+            <a:r>
+              <a:rPr lang="en-US" sz="1400" dirty="0">
+                <a:latin typeface="Roboto Light" panose="02000000000000000000" pitchFamily="2" charset="0"/>
+                <a:ea typeface="Roboto Light" panose="02000000000000000000" pitchFamily="2" charset="0"/>
+              </a:rPr>
+              <a:t>8%</a:t>
+            </a:r>
+          </a:p>
+        </p:txBody>
+      </p:sp>
+      <p:sp>
+        <p:nvSpPr>
+          <p:cNvPr id="22" name="Rectangle 21">
+            <a:extLst>
+              <a:ext uri="{FF2B5EF4-FFF2-40B4-BE49-F238E27FC236}">
+                <a16:creationId xmlns:a16="http://schemas.microsoft.com/office/drawing/2014/main" id="{2E282F90-079C-35A6-0CBA-14A5526DBBC6}"/>
+              </a:ext>
+            </a:extLst>
+          </p:cNvPr>
+          <p:cNvSpPr/>
+          <p:nvPr/>
+        </p:nvSpPr>
+        <p:spPr>
+          <a:xfrm>
+            <a:off x="3434080" y="3627208"/>
+            <a:ext cx="4114800" cy="386080"/>
+          </a:xfrm>
+          <a:prstGeom prst="rect">
+            <a:avLst/>
+          </a:prstGeom>
+          <a:solidFill>
+            <a:schemeClr val="accent5"/>
+          </a:solidFill>
+          <a:ln>
+            <a:noFill/>
+          </a:ln>
+        </p:spPr>
+        <p:style>
+          <a:lnRef idx="2">
+            <a:schemeClr val="accent1">
+              <a:shade val="50000"/>
+            </a:schemeClr>
+          </a:lnRef>
+          <a:fillRef idx="1">
+            <a:schemeClr val="accent1"/>
+          </a:fillRef>
+          <a:effectRef idx="0">
+            <a:schemeClr val="accent1"/>
+          </a:effectRef>
+          <a:fontRef idx="minor">
+            <a:schemeClr val="lt1"/>
+          </a:fontRef>
+        </p:style>
+        <p:txBody>
+          <a:bodyPr rtlCol="0" anchor="ctr"/>
+          <a:lstStyle/>
+          <a:p>
+            <a:pPr algn="ctr"/>
+            <a:endParaRPr lang="en-US"/>
+          </a:p>
+        </p:txBody>
+      </p:sp>
+      <p:sp>
+        <p:nvSpPr>
+          <p:cNvPr id="23" name="Rectangle 22">
+            <a:extLst>
+              <a:ext uri="{FF2B5EF4-FFF2-40B4-BE49-F238E27FC236}">
+                <a16:creationId xmlns:a16="http://schemas.microsoft.com/office/drawing/2014/main" id="{5F3BDBA3-5F85-15DA-9280-44181E1BDFEB}"/>
+              </a:ext>
+            </a:extLst>
+          </p:cNvPr>
+          <p:cNvSpPr/>
+          <p:nvPr/>
+        </p:nvSpPr>
+        <p:spPr>
+          <a:xfrm>
+            <a:off x="7625080" y="3627208"/>
+            <a:ext cx="1259840" cy="386080"/>
+          </a:xfrm>
+          <a:prstGeom prst="rect">
+            <a:avLst/>
+          </a:prstGeom>
+          <a:gradFill flip="none" rotWithShape="1">
+            <a:gsLst>
+              <a:gs pos="0">
+                <a:schemeClr val="accent5"/>
+              </a:gs>
+              <a:gs pos="100000">
+                <a:schemeClr val="accent4"/>
+              </a:gs>
+              <a:gs pos="100000">
+                <a:srgbClr val="FFC000"/>
+              </a:gs>
+            </a:gsLst>
+            <a:lin ang="0" scaled="1"/>
+            <a:tileRect/>
+          </a:gradFill>
+          <a:ln>
+            <a:noFill/>
+          </a:ln>
+        </p:spPr>
+        <p:style>
+          <a:lnRef idx="2">
+            <a:schemeClr val="accent1">
+              <a:shade val="50000"/>
+            </a:schemeClr>
+          </a:lnRef>
+          <a:fillRef idx="1">
+            <a:schemeClr val="accent1"/>
+          </a:fillRef>
+          <a:effectRef idx="0">
+            <a:schemeClr val="accent1"/>
+          </a:effectRef>
+          <a:fontRef idx="minor">
+            <a:schemeClr val="lt1"/>
+          </a:fontRef>
+        </p:style>
+        <p:txBody>
+          <a:bodyPr rtlCol="0" anchor="ctr"/>
+          <a:lstStyle/>
+          <a:p>
+            <a:pPr algn="ctr"/>
+            <a:endParaRPr lang="en-US" dirty="0"/>
+          </a:p>
+        </p:txBody>
+      </p:sp>
+      <p:sp>
+        <p:nvSpPr>
+          <p:cNvPr id="24" name="Rectangle 23">
+            <a:extLst>
+              <a:ext uri="{FF2B5EF4-FFF2-40B4-BE49-F238E27FC236}">
+                <a16:creationId xmlns:a16="http://schemas.microsoft.com/office/drawing/2014/main" id="{FE7FEB2E-B51D-9D23-40BE-6FFA7729D0B6}"/>
+              </a:ext>
+            </a:extLst>
+          </p:cNvPr>
+          <p:cNvSpPr/>
+          <p:nvPr/>
+        </p:nvSpPr>
+        <p:spPr>
+          <a:xfrm>
+            <a:off x="8973102" y="3628920"/>
+            <a:ext cx="1095458" cy="386080"/>
+          </a:xfrm>
+          <a:prstGeom prst="rect">
+            <a:avLst/>
+          </a:prstGeom>
+          <a:solidFill>
+            <a:srgbClr val="FFC000"/>
+          </a:solidFill>
+          <a:ln>
+            <a:noFill/>
+          </a:ln>
+        </p:spPr>
+        <p:style>
+          <a:lnRef idx="2">
+            <a:schemeClr val="accent1">
+              <a:shade val="50000"/>
+            </a:schemeClr>
+          </a:lnRef>
+          <a:fillRef idx="1">
+            <a:schemeClr val="accent1"/>
+          </a:fillRef>
+          <a:effectRef idx="0">
+            <a:schemeClr val="accent1"/>
+          </a:effectRef>
+          <a:fontRef idx="minor">
+            <a:schemeClr val="lt1"/>
+          </a:fontRef>
+        </p:style>
+        <p:txBody>
+          <a:bodyPr rtlCol="0" anchor="ctr"/>
+          <a:lstStyle/>
+          <a:p>
+            <a:pPr algn="ctr"/>
+            <a:endParaRPr lang="en-US"/>
+          </a:p>
+        </p:txBody>
+      </p:sp>
+      <p:sp>
+        <p:nvSpPr>
+          <p:cNvPr id="25" name="TextBox 24">
+            <a:extLst>
+              <a:ext uri="{FF2B5EF4-FFF2-40B4-BE49-F238E27FC236}">
+                <a16:creationId xmlns:a16="http://schemas.microsoft.com/office/drawing/2014/main" id="{E7BB43D3-D4D9-F755-E635-82C06F14E810}"/>
+              </a:ext>
+            </a:extLst>
+          </p:cNvPr>
+          <p:cNvSpPr txBox="1"/>
+          <p:nvPr/>
+        </p:nvSpPr>
+        <p:spPr>
+          <a:xfrm>
+            <a:off x="2141316" y="3635916"/>
+            <a:ext cx="1111202" cy="369332"/>
+          </a:xfrm>
+          <a:prstGeom prst="rect">
+            <a:avLst/>
+          </a:prstGeom>
+          <a:noFill/>
+        </p:spPr>
+        <p:txBody>
+          <a:bodyPr wrap="none" rtlCol="0">
+            <a:spAutoFit/>
+          </a:bodyPr>
+          <a:lstStyle/>
+          <a:p>
+            <a:pPr algn="r"/>
+            <a:r>
+              <a:rPr lang="en-US" dirty="0">
+                <a:latin typeface="Roboto Light" panose="02000000000000000000" pitchFamily="2" charset="0"/>
+                <a:ea typeface="Roboto Light" panose="02000000000000000000" pitchFamily="2" charset="0"/>
+              </a:rPr>
+              <a:t>Drug Use</a:t>
+            </a:r>
+          </a:p>
+        </p:txBody>
+      </p:sp>
+      <p:sp>
+        <p:nvSpPr>
+          <p:cNvPr id="26" name="TextBox 25">
+            <a:extLst>
+              <a:ext uri="{FF2B5EF4-FFF2-40B4-BE49-F238E27FC236}">
+                <a16:creationId xmlns:a16="http://schemas.microsoft.com/office/drawing/2014/main" id="{6279A6D2-2701-E508-0101-C031B7F574A2}"/>
+              </a:ext>
+            </a:extLst>
+          </p:cNvPr>
+          <p:cNvSpPr txBox="1"/>
+          <p:nvPr/>
+        </p:nvSpPr>
+        <p:spPr>
+          <a:xfrm>
+            <a:off x="4979645" y="3344037"/>
+            <a:ext cx="659155" cy="307777"/>
+          </a:xfrm>
+          <a:prstGeom prst="rect">
+            <a:avLst/>
+          </a:prstGeom>
+          <a:noFill/>
+        </p:spPr>
+        <p:txBody>
+          <a:bodyPr wrap="none" rtlCol="0">
+            <a:spAutoFit/>
+          </a:bodyPr>
+          <a:lstStyle/>
+          <a:p>
+            <a:r>
+              <a:rPr lang="en-US" sz="1400" dirty="0">
+                <a:latin typeface="Roboto Light" panose="02000000000000000000" pitchFamily="2" charset="0"/>
+                <a:ea typeface="Roboto Light" panose="02000000000000000000" pitchFamily="2" charset="0"/>
+              </a:rPr>
+              <a:t>64.7%</a:t>
+            </a:r>
+          </a:p>
+        </p:txBody>
+      </p:sp>
+      <p:sp>
+        <p:nvSpPr>
+          <p:cNvPr id="27" name="TextBox 26">
+            <a:extLst>
+              <a:ext uri="{FF2B5EF4-FFF2-40B4-BE49-F238E27FC236}">
+                <a16:creationId xmlns:a16="http://schemas.microsoft.com/office/drawing/2014/main" id="{B9252628-CC84-106B-2A0D-70A07A283034}"/>
+              </a:ext>
+            </a:extLst>
+          </p:cNvPr>
+          <p:cNvSpPr txBox="1"/>
+          <p:nvPr/>
+        </p:nvSpPr>
+        <p:spPr>
+          <a:xfrm>
+            <a:off x="7926667" y="3352071"/>
+            <a:ext cx="659155" cy="307777"/>
+          </a:xfrm>
+          <a:prstGeom prst="rect">
+            <a:avLst/>
+          </a:prstGeom>
+          <a:noFill/>
+        </p:spPr>
+        <p:txBody>
+          <a:bodyPr wrap="none" rtlCol="0">
+            <a:spAutoFit/>
+          </a:bodyPr>
+          <a:lstStyle/>
+          <a:p>
+            <a:r>
+              <a:rPr lang="en-US" sz="1400" dirty="0">
+                <a:latin typeface="Roboto Light" panose="02000000000000000000" pitchFamily="2" charset="0"/>
+                <a:ea typeface="Roboto Light" panose="02000000000000000000" pitchFamily="2" charset="0"/>
+              </a:rPr>
+              <a:t>19.7%</a:t>
+            </a:r>
+          </a:p>
+        </p:txBody>
+      </p:sp>
+      <p:sp>
+        <p:nvSpPr>
+          <p:cNvPr id="28" name="TextBox 27">
+            <a:extLst>
+              <a:ext uri="{FF2B5EF4-FFF2-40B4-BE49-F238E27FC236}">
+                <a16:creationId xmlns:a16="http://schemas.microsoft.com/office/drawing/2014/main" id="{D2DB9489-696C-BE01-1823-0F5D1D90C94D}"/>
+              </a:ext>
+            </a:extLst>
+          </p:cNvPr>
+          <p:cNvSpPr txBox="1"/>
+          <p:nvPr/>
+        </p:nvSpPr>
+        <p:spPr>
+          <a:xfrm>
+            <a:off x="9345282" y="3353468"/>
+            <a:ext cx="659155" cy="307777"/>
+          </a:xfrm>
+          <a:prstGeom prst="rect">
+            <a:avLst/>
+          </a:prstGeom>
+          <a:noFill/>
+        </p:spPr>
+        <p:txBody>
+          <a:bodyPr wrap="none" rtlCol="0">
+            <a:spAutoFit/>
+          </a:bodyPr>
+          <a:lstStyle/>
+          <a:p>
+            <a:r>
+              <a:rPr lang="en-US" sz="1400" dirty="0">
+                <a:latin typeface="Roboto Light" panose="02000000000000000000" pitchFamily="2" charset="0"/>
+                <a:ea typeface="Roboto Light" panose="02000000000000000000" pitchFamily="2" charset="0"/>
+              </a:rPr>
+              <a:t>15.6%</a:t>
+            </a:r>
+          </a:p>
+        </p:txBody>
+      </p:sp>
+      <p:sp>
+        <p:nvSpPr>
+          <p:cNvPr id="29" name="Rectangle 28">
+            <a:extLst>
+              <a:ext uri="{FF2B5EF4-FFF2-40B4-BE49-F238E27FC236}">
+                <a16:creationId xmlns:a16="http://schemas.microsoft.com/office/drawing/2014/main" id="{4B01D369-A0E5-E25F-B0B4-072EECB23AC2}"/>
+              </a:ext>
+            </a:extLst>
+          </p:cNvPr>
+          <p:cNvSpPr/>
+          <p:nvPr/>
+        </p:nvSpPr>
+        <p:spPr>
+          <a:xfrm>
+            <a:off x="3434080" y="4373135"/>
+            <a:ext cx="5706614" cy="386080"/>
+          </a:xfrm>
+          <a:prstGeom prst="rect">
+            <a:avLst/>
+          </a:prstGeom>
+          <a:solidFill>
+            <a:schemeClr val="accent5"/>
+          </a:solidFill>
+          <a:ln>
+            <a:noFill/>
+          </a:ln>
+        </p:spPr>
+        <p:style>
+          <a:lnRef idx="2">
+            <a:schemeClr val="accent1">
+              <a:shade val="50000"/>
+            </a:schemeClr>
+          </a:lnRef>
+          <a:fillRef idx="1">
+            <a:schemeClr val="accent1"/>
+          </a:fillRef>
+          <a:effectRef idx="0">
+            <a:schemeClr val="accent1"/>
+          </a:effectRef>
+          <a:fontRef idx="minor">
+            <a:schemeClr val="lt1"/>
+          </a:fontRef>
+        </p:style>
+        <p:txBody>
+          <a:bodyPr rtlCol="0" anchor="ctr"/>
+          <a:lstStyle/>
+          <a:p>
+            <a:pPr algn="ctr"/>
+            <a:endParaRPr lang="en-US" dirty="0"/>
+          </a:p>
+        </p:txBody>
+      </p:sp>
+      <p:sp>
+        <p:nvSpPr>
+          <p:cNvPr id="30" name="Rectangle 29">
+            <a:extLst>
+              <a:ext uri="{FF2B5EF4-FFF2-40B4-BE49-F238E27FC236}">
+                <a16:creationId xmlns:a16="http://schemas.microsoft.com/office/drawing/2014/main" id="{ECAC943A-8FB1-8A21-AB65-0694061EC95A}"/>
+              </a:ext>
+            </a:extLst>
+          </p:cNvPr>
+          <p:cNvSpPr/>
+          <p:nvPr/>
+        </p:nvSpPr>
+        <p:spPr>
+          <a:xfrm>
+            <a:off x="9230710" y="4358092"/>
+            <a:ext cx="606838" cy="386080"/>
+          </a:xfrm>
+          <a:prstGeom prst="rect">
+            <a:avLst/>
+          </a:prstGeom>
+          <a:gradFill flip="none" rotWithShape="1">
+            <a:gsLst>
+              <a:gs pos="0">
+                <a:schemeClr val="accent5"/>
+              </a:gs>
+              <a:gs pos="100000">
+                <a:schemeClr val="accent4"/>
+              </a:gs>
+              <a:gs pos="100000">
+                <a:srgbClr val="FFC000"/>
+              </a:gs>
+            </a:gsLst>
+            <a:lin ang="0" scaled="1"/>
+            <a:tileRect/>
+          </a:gradFill>
+          <a:ln>
+            <a:noFill/>
+          </a:ln>
+        </p:spPr>
+        <p:style>
+          <a:lnRef idx="2">
+            <a:schemeClr val="accent1">
+              <a:shade val="50000"/>
+            </a:schemeClr>
+          </a:lnRef>
+          <a:fillRef idx="1">
+            <a:schemeClr val="accent1"/>
+          </a:fillRef>
+          <a:effectRef idx="0">
+            <a:schemeClr val="accent1"/>
+          </a:effectRef>
+          <a:fontRef idx="minor">
+            <a:schemeClr val="lt1"/>
+          </a:fontRef>
+        </p:style>
+        <p:txBody>
+          <a:bodyPr rtlCol="0" anchor="ctr"/>
+          <a:lstStyle/>
+          <a:p>
+            <a:pPr algn="ctr"/>
+            <a:endParaRPr lang="en-US" dirty="0"/>
+          </a:p>
+        </p:txBody>
+      </p:sp>
+      <p:sp>
+        <p:nvSpPr>
+          <p:cNvPr id="31" name="Rectangle 30">
+            <a:extLst>
+              <a:ext uri="{FF2B5EF4-FFF2-40B4-BE49-F238E27FC236}">
+                <a16:creationId xmlns:a16="http://schemas.microsoft.com/office/drawing/2014/main" id="{07D8CA73-E112-FD0B-8CB0-95C357FB76B1}"/>
+              </a:ext>
+            </a:extLst>
+          </p:cNvPr>
+          <p:cNvSpPr/>
+          <p:nvPr/>
+        </p:nvSpPr>
+        <p:spPr>
+          <a:xfrm>
+            <a:off x="9927564" y="4358092"/>
+            <a:ext cx="132080" cy="386080"/>
+          </a:xfrm>
+          <a:prstGeom prst="rect">
+            <a:avLst/>
+          </a:prstGeom>
+          <a:solidFill>
+            <a:srgbClr val="FFC000"/>
+          </a:solidFill>
+          <a:ln>
+            <a:noFill/>
+          </a:ln>
+        </p:spPr>
+        <p:style>
+          <a:lnRef idx="2">
+            <a:schemeClr val="accent1">
+              <a:shade val="50000"/>
+            </a:schemeClr>
+          </a:lnRef>
+          <a:fillRef idx="1">
+            <a:schemeClr val="accent1"/>
+          </a:fillRef>
+          <a:effectRef idx="0">
+            <a:schemeClr val="accent1"/>
+          </a:effectRef>
+          <a:fontRef idx="minor">
+            <a:schemeClr val="lt1"/>
+          </a:fontRef>
+        </p:style>
+        <p:txBody>
+          <a:bodyPr rtlCol="0" anchor="ctr"/>
+          <a:lstStyle/>
+          <a:p>
+            <a:pPr algn="ctr"/>
+            <a:endParaRPr lang="en-US"/>
+          </a:p>
+        </p:txBody>
+      </p:sp>
+      <p:sp>
+        <p:nvSpPr>
+          <p:cNvPr id="32" name="TextBox 31">
+            <a:extLst>
+              <a:ext uri="{FF2B5EF4-FFF2-40B4-BE49-F238E27FC236}">
+                <a16:creationId xmlns:a16="http://schemas.microsoft.com/office/drawing/2014/main" id="{3806DF21-1C28-E4BA-F0EB-546F68B9D050}"/>
+              </a:ext>
+            </a:extLst>
+          </p:cNvPr>
+          <p:cNvSpPr txBox="1"/>
+          <p:nvPr/>
+        </p:nvSpPr>
+        <p:spPr>
+          <a:xfrm>
+            <a:off x="1788656" y="4358093"/>
+            <a:ext cx="1463862" cy="369332"/>
+          </a:xfrm>
+          <a:prstGeom prst="rect">
+            <a:avLst/>
+          </a:prstGeom>
+          <a:noFill/>
+        </p:spPr>
+        <p:txBody>
+          <a:bodyPr wrap="none" rtlCol="0">
+            <a:spAutoFit/>
+          </a:bodyPr>
+          <a:lstStyle/>
+          <a:p>
+            <a:pPr algn="r"/>
+            <a:r>
+              <a:rPr lang="en-US" dirty="0">
+                <a:latin typeface="Roboto Light" panose="02000000000000000000" pitchFamily="2" charset="0"/>
+                <a:ea typeface="Roboto Light" panose="02000000000000000000" pitchFamily="2" charset="0"/>
+              </a:rPr>
+              <a:t>Employment</a:t>
+            </a:r>
+          </a:p>
+        </p:txBody>
+      </p:sp>
+      <p:sp>
+        <p:nvSpPr>
+          <p:cNvPr id="33" name="TextBox 32">
+            <a:extLst>
+              <a:ext uri="{FF2B5EF4-FFF2-40B4-BE49-F238E27FC236}">
+                <a16:creationId xmlns:a16="http://schemas.microsoft.com/office/drawing/2014/main" id="{A041266A-0A74-E851-B6C3-8E008A21C1CF}"/>
+              </a:ext>
+            </a:extLst>
+          </p:cNvPr>
+          <p:cNvSpPr txBox="1"/>
+          <p:nvPr/>
+        </p:nvSpPr>
+        <p:spPr>
+          <a:xfrm>
+            <a:off x="5857862" y="4068582"/>
+            <a:ext cx="659155" cy="307777"/>
+          </a:xfrm>
+          <a:prstGeom prst="rect">
+            <a:avLst/>
+          </a:prstGeom>
+          <a:noFill/>
+        </p:spPr>
+        <p:txBody>
+          <a:bodyPr wrap="none" rtlCol="0">
+            <a:spAutoFit/>
+          </a:bodyPr>
+          <a:lstStyle/>
+          <a:p>
+            <a:r>
+              <a:rPr lang="en-US" sz="1400" dirty="0">
+                <a:latin typeface="Roboto Light" panose="02000000000000000000" pitchFamily="2" charset="0"/>
+                <a:ea typeface="Roboto Light" panose="02000000000000000000" pitchFamily="2" charset="0"/>
+              </a:rPr>
+              <a:t>90.2%</a:t>
+            </a:r>
+          </a:p>
+        </p:txBody>
+      </p:sp>
+      <p:sp>
+        <p:nvSpPr>
+          <p:cNvPr id="34" name="TextBox 33">
+            <a:extLst>
+              <a:ext uri="{FF2B5EF4-FFF2-40B4-BE49-F238E27FC236}">
+                <a16:creationId xmlns:a16="http://schemas.microsoft.com/office/drawing/2014/main" id="{3B22AAF1-C90E-1905-FAB6-562CFD6452FC}"/>
+              </a:ext>
+            </a:extLst>
+          </p:cNvPr>
+          <p:cNvSpPr txBox="1"/>
+          <p:nvPr/>
+        </p:nvSpPr>
+        <p:spPr>
+          <a:xfrm>
+            <a:off x="9292430" y="4078854"/>
+            <a:ext cx="559769" cy="307777"/>
+          </a:xfrm>
+          <a:prstGeom prst="rect">
+            <a:avLst/>
+          </a:prstGeom>
+          <a:noFill/>
+        </p:spPr>
+        <p:txBody>
+          <a:bodyPr wrap="none" rtlCol="0">
+            <a:spAutoFit/>
+          </a:bodyPr>
+          <a:lstStyle/>
+          <a:p>
+            <a:r>
+              <a:rPr lang="en-US" sz="1400" dirty="0">
+                <a:latin typeface="Roboto Light" panose="02000000000000000000" pitchFamily="2" charset="0"/>
+                <a:ea typeface="Roboto Light" panose="02000000000000000000" pitchFamily="2" charset="0"/>
+              </a:rPr>
+              <a:t>7.8%</a:t>
+            </a:r>
+          </a:p>
+        </p:txBody>
+      </p:sp>
+      <p:sp>
+        <p:nvSpPr>
+          <p:cNvPr id="35" name="TextBox 34">
+            <a:extLst>
+              <a:ext uri="{FF2B5EF4-FFF2-40B4-BE49-F238E27FC236}">
+                <a16:creationId xmlns:a16="http://schemas.microsoft.com/office/drawing/2014/main" id="{506D0BC0-51E6-327F-56D3-E477BDA7C74A}"/>
+              </a:ext>
+            </a:extLst>
+          </p:cNvPr>
+          <p:cNvSpPr txBox="1"/>
+          <p:nvPr/>
+        </p:nvSpPr>
+        <p:spPr>
+          <a:xfrm>
+            <a:off x="9774679" y="4100633"/>
+            <a:ext cx="559769" cy="307777"/>
+          </a:xfrm>
+          <a:prstGeom prst="rect">
+            <a:avLst/>
+          </a:prstGeom>
+          <a:noFill/>
+        </p:spPr>
+        <p:txBody>
+          <a:bodyPr wrap="none" rtlCol="0">
+            <a:spAutoFit/>
+          </a:bodyPr>
+          <a:lstStyle/>
+          <a:p>
+            <a:r>
+              <a:rPr lang="en-US" sz="1400" dirty="0">
+                <a:latin typeface="Roboto Light" panose="02000000000000000000" pitchFamily="2" charset="0"/>
+                <a:ea typeface="Roboto Light" panose="02000000000000000000" pitchFamily="2" charset="0"/>
+              </a:rPr>
+              <a:t>1.9%</a:t>
+            </a:r>
+          </a:p>
+        </p:txBody>
+      </p:sp>
+      <p:sp>
+        <p:nvSpPr>
+          <p:cNvPr id="36" name="Rectangle 35">
+            <a:extLst>
+              <a:ext uri="{FF2B5EF4-FFF2-40B4-BE49-F238E27FC236}">
+                <a16:creationId xmlns:a16="http://schemas.microsoft.com/office/drawing/2014/main" id="{A4916C20-F2CD-4969-BF70-7362966860CC}"/>
+              </a:ext>
+            </a:extLst>
+          </p:cNvPr>
+          <p:cNvSpPr/>
+          <p:nvPr/>
+        </p:nvSpPr>
+        <p:spPr>
+          <a:xfrm>
+            <a:off x="3434080" y="5076442"/>
+            <a:ext cx="3992880" cy="386080"/>
+          </a:xfrm>
+          <a:prstGeom prst="rect">
+            <a:avLst/>
+          </a:prstGeom>
+          <a:solidFill>
+            <a:schemeClr val="accent5"/>
+          </a:solidFill>
+          <a:ln>
+            <a:noFill/>
+          </a:ln>
+        </p:spPr>
+        <p:style>
+          <a:lnRef idx="2">
+            <a:schemeClr val="accent1">
+              <a:shade val="50000"/>
+            </a:schemeClr>
+          </a:lnRef>
+          <a:fillRef idx="1">
+            <a:schemeClr val="accent1"/>
+          </a:fillRef>
+          <a:effectRef idx="0">
+            <a:schemeClr val="accent1"/>
+          </a:effectRef>
+          <a:fontRef idx="minor">
+            <a:schemeClr val="lt1"/>
+          </a:fontRef>
+        </p:style>
+        <p:txBody>
+          <a:bodyPr rtlCol="0" anchor="ctr"/>
+          <a:lstStyle/>
+          <a:p>
+            <a:pPr algn="ctr"/>
+            <a:endParaRPr lang="en-US" dirty="0"/>
+          </a:p>
+        </p:txBody>
+      </p:sp>
+      <p:sp>
+        <p:nvSpPr>
+          <p:cNvPr id="37" name="Rectangle 36">
+            <a:extLst>
+              <a:ext uri="{FF2B5EF4-FFF2-40B4-BE49-F238E27FC236}">
+                <a16:creationId xmlns:a16="http://schemas.microsoft.com/office/drawing/2014/main" id="{FC861D80-7E1C-C389-D1D7-9E0D5E341417}"/>
+              </a:ext>
+            </a:extLst>
+          </p:cNvPr>
+          <p:cNvSpPr/>
+          <p:nvPr/>
+        </p:nvSpPr>
+        <p:spPr>
+          <a:xfrm>
+            <a:off x="7512969" y="5076442"/>
+            <a:ext cx="375920" cy="386080"/>
+          </a:xfrm>
+          <a:prstGeom prst="rect">
+            <a:avLst/>
+          </a:prstGeom>
+          <a:gradFill flip="none" rotWithShape="1">
+            <a:gsLst>
+              <a:gs pos="0">
+                <a:schemeClr val="accent5"/>
+              </a:gs>
+              <a:gs pos="100000">
+                <a:schemeClr val="accent4"/>
+              </a:gs>
+              <a:gs pos="100000">
+                <a:srgbClr val="FFC000"/>
+              </a:gs>
+            </a:gsLst>
+            <a:lin ang="0" scaled="1"/>
+            <a:tileRect/>
+          </a:gradFill>
+          <a:ln>
+            <a:noFill/>
+          </a:ln>
+        </p:spPr>
+        <p:style>
+          <a:lnRef idx="2">
+            <a:schemeClr val="accent1">
+              <a:shade val="50000"/>
+            </a:schemeClr>
+          </a:lnRef>
+          <a:fillRef idx="1">
+            <a:schemeClr val="accent1"/>
+          </a:fillRef>
+          <a:effectRef idx="0">
+            <a:schemeClr val="accent1"/>
+          </a:effectRef>
+          <a:fontRef idx="minor">
+            <a:schemeClr val="lt1"/>
+          </a:fontRef>
+        </p:style>
+        <p:txBody>
+          <a:bodyPr rtlCol="0" anchor="ctr"/>
+          <a:lstStyle/>
+          <a:p>
+            <a:pPr algn="ctr"/>
+            <a:endParaRPr lang="en-US" dirty="0"/>
+          </a:p>
+        </p:txBody>
+      </p:sp>
+      <p:sp>
+        <p:nvSpPr>
+          <p:cNvPr id="38" name="Rectangle 37">
+            <a:extLst>
+              <a:ext uri="{FF2B5EF4-FFF2-40B4-BE49-F238E27FC236}">
+                <a16:creationId xmlns:a16="http://schemas.microsoft.com/office/drawing/2014/main" id="{203508DA-924A-7712-6A47-9B4745FC892E}"/>
+              </a:ext>
+            </a:extLst>
+          </p:cNvPr>
+          <p:cNvSpPr/>
+          <p:nvPr/>
+        </p:nvSpPr>
+        <p:spPr>
+          <a:xfrm>
+            <a:off x="7974898" y="5091846"/>
+            <a:ext cx="2079666" cy="386080"/>
+          </a:xfrm>
+          <a:prstGeom prst="rect">
+            <a:avLst/>
+          </a:prstGeom>
+          <a:solidFill>
+            <a:srgbClr val="FFC000"/>
+          </a:solidFill>
+          <a:ln>
+            <a:noFill/>
+          </a:ln>
+        </p:spPr>
+        <p:style>
+          <a:lnRef idx="2">
+            <a:schemeClr val="accent1">
+              <a:shade val="50000"/>
+            </a:schemeClr>
+          </a:lnRef>
+          <a:fillRef idx="1">
+            <a:schemeClr val="accent1"/>
+          </a:fillRef>
+          <a:effectRef idx="0">
+            <a:schemeClr val="accent1"/>
+          </a:effectRef>
+          <a:fontRef idx="minor">
+            <a:schemeClr val="lt1"/>
+          </a:fontRef>
+        </p:style>
+        <p:txBody>
+          <a:bodyPr rtlCol="0" anchor="ctr"/>
+          <a:lstStyle/>
+          <a:p>
+            <a:pPr algn="ctr"/>
+            <a:endParaRPr lang="en-US"/>
+          </a:p>
+        </p:txBody>
+      </p:sp>
+      <p:sp>
+        <p:nvSpPr>
+          <p:cNvPr id="39" name="TextBox 38">
+            <a:extLst>
+              <a:ext uri="{FF2B5EF4-FFF2-40B4-BE49-F238E27FC236}">
+                <a16:creationId xmlns:a16="http://schemas.microsoft.com/office/drawing/2014/main" id="{6D2B70B9-6F80-4F6A-FB77-8EAF44DDA2B7}"/>
+              </a:ext>
+            </a:extLst>
+          </p:cNvPr>
+          <p:cNvSpPr txBox="1"/>
+          <p:nvPr/>
+        </p:nvSpPr>
+        <p:spPr>
+          <a:xfrm>
+            <a:off x="1567441" y="5061400"/>
+            <a:ext cx="1685077" cy="369332"/>
+          </a:xfrm>
+          <a:prstGeom prst="rect">
+            <a:avLst/>
+          </a:prstGeom>
+          <a:noFill/>
+        </p:spPr>
+        <p:txBody>
+          <a:bodyPr wrap="none" rtlCol="0">
+            <a:spAutoFit/>
+          </a:bodyPr>
+          <a:lstStyle/>
+          <a:p>
+            <a:pPr algn="r"/>
+            <a:r>
+              <a:rPr lang="en-US" dirty="0">
+                <a:latin typeface="Roboto Light" panose="02000000000000000000" pitchFamily="2" charset="0"/>
+                <a:ea typeface="Roboto Light" panose="02000000000000000000" pitchFamily="2" charset="0"/>
+              </a:rPr>
+              <a:t>Homelessness</a:t>
+            </a:r>
+          </a:p>
+        </p:txBody>
+      </p:sp>
+      <p:sp>
+        <p:nvSpPr>
+          <p:cNvPr id="40" name="TextBox 39">
+            <a:extLst>
+              <a:ext uri="{FF2B5EF4-FFF2-40B4-BE49-F238E27FC236}">
+                <a16:creationId xmlns:a16="http://schemas.microsoft.com/office/drawing/2014/main" id="{13C2D52E-9332-DAF3-A801-BF04D05AA31D}"/>
+              </a:ext>
+            </a:extLst>
+          </p:cNvPr>
+          <p:cNvSpPr txBox="1"/>
+          <p:nvPr/>
+        </p:nvSpPr>
+        <p:spPr>
+          <a:xfrm>
+            <a:off x="4979645" y="4811285"/>
+            <a:ext cx="659155" cy="307777"/>
+          </a:xfrm>
+          <a:prstGeom prst="rect">
+            <a:avLst/>
+          </a:prstGeom>
+          <a:noFill/>
+        </p:spPr>
+        <p:txBody>
+          <a:bodyPr wrap="none" rtlCol="0">
+            <a:spAutoFit/>
+          </a:bodyPr>
+          <a:lstStyle/>
+          <a:p>
+            <a:r>
+              <a:rPr lang="en-US" sz="1400" dirty="0">
+                <a:latin typeface="Roboto Light" panose="02000000000000000000" pitchFamily="2" charset="0"/>
+                <a:ea typeface="Roboto Light" panose="02000000000000000000" pitchFamily="2" charset="0"/>
+              </a:rPr>
+              <a:t>63.6%</a:t>
+            </a:r>
+          </a:p>
+        </p:txBody>
+      </p:sp>
+      <p:sp>
+        <p:nvSpPr>
+          <p:cNvPr id="41" name="TextBox 40">
+            <a:extLst>
+              <a:ext uri="{FF2B5EF4-FFF2-40B4-BE49-F238E27FC236}">
+                <a16:creationId xmlns:a16="http://schemas.microsoft.com/office/drawing/2014/main" id="{BD0B30EE-7C50-E9D8-2C50-CEDE731C67F0}"/>
+              </a:ext>
+            </a:extLst>
+          </p:cNvPr>
+          <p:cNvSpPr txBox="1"/>
+          <p:nvPr/>
+        </p:nvSpPr>
+        <p:spPr>
+          <a:xfrm>
+            <a:off x="7454086" y="4815620"/>
+            <a:ext cx="559769" cy="307777"/>
+          </a:xfrm>
+          <a:prstGeom prst="rect">
+            <a:avLst/>
+          </a:prstGeom>
+          <a:noFill/>
+        </p:spPr>
+        <p:txBody>
+          <a:bodyPr wrap="none" rtlCol="0">
+            <a:spAutoFit/>
+          </a:bodyPr>
+          <a:lstStyle/>
+          <a:p>
+            <a:r>
+              <a:rPr lang="en-US" sz="1400" dirty="0">
+                <a:latin typeface="Roboto Light" panose="02000000000000000000" pitchFamily="2" charset="0"/>
+                <a:ea typeface="Roboto Light" panose="02000000000000000000" pitchFamily="2" charset="0"/>
+              </a:rPr>
+              <a:t>4.4%</a:t>
+            </a:r>
+          </a:p>
+        </p:txBody>
+      </p:sp>
+      <p:sp>
+        <p:nvSpPr>
+          <p:cNvPr id="42" name="TextBox 41">
+            <a:extLst>
+              <a:ext uri="{FF2B5EF4-FFF2-40B4-BE49-F238E27FC236}">
+                <a16:creationId xmlns:a16="http://schemas.microsoft.com/office/drawing/2014/main" id="{F0DC6780-8401-706F-372B-765F599CF498}"/>
+              </a:ext>
+            </a:extLst>
+          </p:cNvPr>
+          <p:cNvSpPr txBox="1"/>
+          <p:nvPr/>
+        </p:nvSpPr>
+        <p:spPr>
+          <a:xfrm>
+            <a:off x="8734846" y="4815620"/>
+            <a:ext cx="659155" cy="307777"/>
+          </a:xfrm>
+          <a:prstGeom prst="rect">
+            <a:avLst/>
+          </a:prstGeom>
+          <a:noFill/>
+        </p:spPr>
+        <p:txBody>
+          <a:bodyPr wrap="none" rtlCol="0">
+            <a:spAutoFit/>
+          </a:bodyPr>
+          <a:lstStyle/>
+          <a:p>
+            <a:r>
+              <a:rPr lang="en-US" sz="1400" dirty="0">
+                <a:latin typeface="Roboto Light" panose="02000000000000000000" pitchFamily="2" charset="0"/>
+                <a:ea typeface="Roboto Light" panose="02000000000000000000" pitchFamily="2" charset="0"/>
+              </a:rPr>
+              <a:t>31.9%</a:t>
+            </a:r>
+          </a:p>
+        </p:txBody>
+      </p:sp>
+    </p:spTree>
+    <p:extLst>
+      <p:ext uri="{BB962C8B-B14F-4D97-AF65-F5344CB8AC3E}">
+        <p14:creationId xmlns:p14="http://schemas.microsoft.com/office/powerpoint/2010/main" val="2909554008"/>
+      </p:ext>
+    </p:extLst>
+  </p:cSld>
+  <p:clrMapOvr>
+    <a:masterClrMapping/>
+  </p:clrMapOvr>
+</p:sld>
+</file>
+
 <file path=ppt/theme/theme1.xml><?xml version="1.0" encoding="utf-8"?>
 <a:theme xmlns:a="http://schemas.openxmlformats.org/drawingml/2006/main" name="Office Theme">
   <a:themeElements>

</xml_diff>